<commit_message>
minor improvements to agnostic picture
</commit_message>
<xml_diff>
--- a/doc/src/images/agnostic_architecture.pptx
+++ b/doc/src/images/agnostic_architecture.pptx
@@ -259,7 +259,7 @@
           <a:p>
             <a:fld id="{478C60FA-FF42-434C-85DD-D3315C9BAB2E}" type="datetimeFigureOut">
               <a:rPr lang="fr-FR" smtClean="0"/>
-              <a:t>16/07/2024</a:t>
+              <a:t>12/08/2024</a:t>
             </a:fld>
             <a:endParaRPr lang="fr-FR"/>
           </a:p>
@@ -313,7 +313,7 @@
           <a:p>
             <a:fld id="{8D1A531F-1000-4CAC-A0AE-F30213C735CA}" type="slidenum">
               <a:rPr lang="fr-FR" smtClean="0"/>
-              <a:t>‹N°›</a:t>
+              <a:t>‹#›</a:t>
             </a:fld>
             <a:endParaRPr lang="fr-FR"/>
           </a:p>
@@ -457,7 +457,7 @@
           <a:p>
             <a:fld id="{478C60FA-FF42-434C-85DD-D3315C9BAB2E}" type="datetimeFigureOut">
               <a:rPr lang="fr-FR" smtClean="0"/>
-              <a:t>16/07/2024</a:t>
+              <a:t>12/08/2024</a:t>
             </a:fld>
             <a:endParaRPr lang="fr-FR"/>
           </a:p>
@@ -511,7 +511,7 @@
           <a:p>
             <a:fld id="{8D1A531F-1000-4CAC-A0AE-F30213C735CA}" type="slidenum">
               <a:rPr lang="fr-FR" smtClean="0"/>
-              <a:t>‹N°›</a:t>
+              <a:t>‹#›</a:t>
             </a:fld>
             <a:endParaRPr lang="fr-FR"/>
           </a:p>
@@ -665,7 +665,7 @@
           <a:p>
             <a:fld id="{478C60FA-FF42-434C-85DD-D3315C9BAB2E}" type="datetimeFigureOut">
               <a:rPr lang="fr-FR" smtClean="0"/>
-              <a:t>16/07/2024</a:t>
+              <a:t>12/08/2024</a:t>
             </a:fld>
             <a:endParaRPr lang="fr-FR"/>
           </a:p>
@@ -719,7 +719,7 @@
           <a:p>
             <a:fld id="{8D1A531F-1000-4CAC-A0AE-F30213C735CA}" type="slidenum">
               <a:rPr lang="fr-FR" smtClean="0"/>
-              <a:t>‹N°›</a:t>
+              <a:t>‹#›</a:t>
             </a:fld>
             <a:endParaRPr lang="fr-FR"/>
           </a:p>
@@ -863,7 +863,7 @@
           <a:p>
             <a:fld id="{478C60FA-FF42-434C-85DD-D3315C9BAB2E}" type="datetimeFigureOut">
               <a:rPr lang="fr-FR" smtClean="0"/>
-              <a:t>16/07/2024</a:t>
+              <a:t>12/08/2024</a:t>
             </a:fld>
             <a:endParaRPr lang="fr-FR"/>
           </a:p>
@@ -917,7 +917,7 @@
           <a:p>
             <a:fld id="{8D1A531F-1000-4CAC-A0AE-F30213C735CA}" type="slidenum">
               <a:rPr lang="fr-FR" smtClean="0"/>
-              <a:t>‹N°›</a:t>
+              <a:t>‹#›</a:t>
             </a:fld>
             <a:endParaRPr lang="fr-FR"/>
           </a:p>
@@ -1138,7 +1138,7 @@
           <a:p>
             <a:fld id="{478C60FA-FF42-434C-85DD-D3315C9BAB2E}" type="datetimeFigureOut">
               <a:rPr lang="fr-FR" smtClean="0"/>
-              <a:t>16/07/2024</a:t>
+              <a:t>12/08/2024</a:t>
             </a:fld>
             <a:endParaRPr lang="fr-FR"/>
           </a:p>
@@ -1192,7 +1192,7 @@
           <a:p>
             <a:fld id="{8D1A531F-1000-4CAC-A0AE-F30213C735CA}" type="slidenum">
               <a:rPr lang="fr-FR" smtClean="0"/>
-              <a:t>‹N°›</a:t>
+              <a:t>‹#›</a:t>
             </a:fld>
             <a:endParaRPr lang="fr-FR"/>
           </a:p>
@@ -1403,7 +1403,7 @@
           <a:p>
             <a:fld id="{478C60FA-FF42-434C-85DD-D3315C9BAB2E}" type="datetimeFigureOut">
               <a:rPr lang="fr-FR" smtClean="0"/>
-              <a:t>16/07/2024</a:t>
+              <a:t>12/08/2024</a:t>
             </a:fld>
             <a:endParaRPr lang="fr-FR"/>
           </a:p>
@@ -1457,7 +1457,7 @@
           <a:p>
             <a:fld id="{8D1A531F-1000-4CAC-A0AE-F30213C735CA}" type="slidenum">
               <a:rPr lang="fr-FR" smtClean="0"/>
-              <a:t>‹N°›</a:t>
+              <a:t>‹#›</a:t>
             </a:fld>
             <a:endParaRPr lang="fr-FR"/>
           </a:p>
@@ -1815,7 +1815,7 @@
           <a:p>
             <a:fld id="{478C60FA-FF42-434C-85DD-D3315C9BAB2E}" type="datetimeFigureOut">
               <a:rPr lang="fr-FR" smtClean="0"/>
-              <a:t>16/07/2024</a:t>
+              <a:t>12/08/2024</a:t>
             </a:fld>
             <a:endParaRPr lang="fr-FR"/>
           </a:p>
@@ -1869,7 +1869,7 @@
           <a:p>
             <a:fld id="{8D1A531F-1000-4CAC-A0AE-F30213C735CA}" type="slidenum">
               <a:rPr lang="fr-FR" smtClean="0"/>
-              <a:t>‹N°›</a:t>
+              <a:t>‹#›</a:t>
             </a:fld>
             <a:endParaRPr lang="fr-FR"/>
           </a:p>
@@ -1956,7 +1956,7 @@
           <a:p>
             <a:fld id="{478C60FA-FF42-434C-85DD-D3315C9BAB2E}" type="datetimeFigureOut">
               <a:rPr lang="fr-FR" smtClean="0"/>
-              <a:t>16/07/2024</a:t>
+              <a:t>12/08/2024</a:t>
             </a:fld>
             <a:endParaRPr lang="fr-FR"/>
           </a:p>
@@ -2010,7 +2010,7 @@
           <a:p>
             <a:fld id="{8D1A531F-1000-4CAC-A0AE-F30213C735CA}" type="slidenum">
               <a:rPr lang="fr-FR" smtClean="0"/>
-              <a:t>‹N°›</a:t>
+              <a:t>‹#›</a:t>
             </a:fld>
             <a:endParaRPr lang="fr-FR"/>
           </a:p>
@@ -2069,7 +2069,7 @@
           <a:p>
             <a:fld id="{478C60FA-FF42-434C-85DD-D3315C9BAB2E}" type="datetimeFigureOut">
               <a:rPr lang="fr-FR" smtClean="0"/>
-              <a:t>16/07/2024</a:t>
+              <a:t>12/08/2024</a:t>
             </a:fld>
             <a:endParaRPr lang="fr-FR"/>
           </a:p>
@@ -2123,7 +2123,7 @@
           <a:p>
             <a:fld id="{8D1A531F-1000-4CAC-A0AE-F30213C735CA}" type="slidenum">
               <a:rPr lang="fr-FR" smtClean="0"/>
-              <a:t>‹N°›</a:t>
+              <a:t>‹#›</a:t>
             </a:fld>
             <a:endParaRPr lang="fr-FR"/>
           </a:p>
@@ -2380,7 +2380,7 @@
           <a:p>
             <a:fld id="{478C60FA-FF42-434C-85DD-D3315C9BAB2E}" type="datetimeFigureOut">
               <a:rPr lang="fr-FR" smtClean="0"/>
-              <a:t>16/07/2024</a:t>
+              <a:t>12/08/2024</a:t>
             </a:fld>
             <a:endParaRPr lang="fr-FR"/>
           </a:p>
@@ -2434,7 +2434,7 @@
           <a:p>
             <a:fld id="{8D1A531F-1000-4CAC-A0AE-F30213C735CA}" type="slidenum">
               <a:rPr lang="fr-FR" smtClean="0"/>
-              <a:t>‹N°›</a:t>
+              <a:t>‹#›</a:t>
             </a:fld>
             <a:endParaRPr lang="fr-FR"/>
           </a:p>
@@ -2668,7 +2668,7 @@
           <a:p>
             <a:fld id="{478C60FA-FF42-434C-85DD-D3315C9BAB2E}" type="datetimeFigureOut">
               <a:rPr lang="fr-FR" smtClean="0"/>
-              <a:t>16/07/2024</a:t>
+              <a:t>12/08/2024</a:t>
             </a:fld>
             <a:endParaRPr lang="fr-FR"/>
           </a:p>
@@ -2722,7 +2722,7 @@
           <a:p>
             <a:fld id="{8D1A531F-1000-4CAC-A0AE-F30213C735CA}" type="slidenum">
               <a:rPr lang="fr-FR" smtClean="0"/>
-              <a:t>‹N°›</a:t>
+              <a:t>‹#›</a:t>
             </a:fld>
             <a:endParaRPr lang="fr-FR"/>
           </a:p>
@@ -2909,7 +2909,7 @@
           <a:p>
             <a:fld id="{478C60FA-FF42-434C-85DD-D3315C9BAB2E}" type="datetimeFigureOut">
               <a:rPr lang="fr-FR" smtClean="0"/>
-              <a:t>16/07/2024</a:t>
+              <a:t>12/08/2024</a:t>
             </a:fld>
             <a:endParaRPr lang="fr-FR"/>
           </a:p>
@@ -2999,7 +2999,7 @@
           <a:p>
             <a:fld id="{8D1A531F-1000-4CAC-A0AE-F30213C735CA}" type="slidenum">
               <a:rPr lang="fr-FR" smtClean="0"/>
-              <a:t>‹N°›</a:t>
+              <a:t>‹#›</a:t>
             </a:fld>
             <a:endParaRPr lang="fr-FR"/>
           </a:p>
@@ -4678,9 +4678,10 @@
               <a:t>weights</a:t>
             </a:r>
             <a:r>
-              <a:rPr lang="fr-FR" sz="1400" dirty="0"/>
-              <a:t>…</a:t>
-            </a:r>
+              <a:rPr lang="fr-FR" sz="1400"/>
+              <a:t>… callbacks</a:t>
+            </a:r>
+            <a:endParaRPr lang="fr-FR" sz="1400" dirty="0"/>
           </a:p>
         </p:txBody>
       </p:sp>
@@ -4771,7 +4772,7 @@
         <p:spPr>
           <a:xfrm>
             <a:off x="8944073" y="5101936"/>
-            <a:ext cx="2793994" cy="954107"/>
+            <a:ext cx="2793994" cy="1169551"/>
           </a:xfrm>
           <a:prstGeom prst="rect">
             <a:avLst/>
@@ -4833,7 +4834,7 @@
             </a:r>
             <a:r>
               <a:rPr lang="fr-FR" sz="1400" dirty="0" err="1"/>
-              <a:t>Creates</a:t>
+              <a:t>Defines</a:t>
             </a:r>
             <a:r>
               <a:rPr lang="fr-FR" sz="1400" dirty="0"/>
@@ -4843,7 +4844,26 @@
               <a:rPr lang="fr-FR" sz="1400" dirty="0" err="1"/>
               <a:t>functions</a:t>
             </a:r>
-            <a:endParaRPr lang="fr-FR" sz="1400" dirty="0"/>
+            <a:r>
+              <a:rPr lang="fr-FR" sz="1400" dirty="0"/>
+              <a:t> (but </a:t>
+            </a:r>
+            <a:r>
+              <a:rPr lang="fr-FR" sz="1400" dirty="0" err="1"/>
+              <a:t>does</a:t>
+            </a:r>
+            <a:r>
+              <a:rPr lang="fr-FR" sz="1400" dirty="0"/>
+              <a:t> not have callback </a:t>
+            </a:r>
+            <a:r>
+              <a:rPr lang="fr-FR" sz="1400" dirty="0" err="1"/>
+              <a:t>functions</a:t>
+            </a:r>
+            <a:r>
+              <a:rPr lang="fr-FR" sz="1400" dirty="0"/>
+              <a:t>)</a:t>
+            </a:r>
           </a:p>
         </p:txBody>
       </p:sp>
@@ -4908,8 +4928,8 @@
         </p:nvCxnSpPr>
         <p:spPr>
           <a:xfrm flipH="1">
-            <a:off x="7295532" y="5578990"/>
-            <a:ext cx="1648541" cy="225186"/>
+            <a:off x="7295532" y="5686712"/>
+            <a:ext cx="1648541" cy="117464"/>
           </a:xfrm>
           <a:prstGeom prst="straightConnector1">
             <a:avLst/>

</xml_diff>